<commit_message>
Modify ROS and ROS-lite figures
</commit_message>
<xml_diff>
--- a/figure/ros_pubsub.pptx
+++ b/figure/ros_pubsub.pptx
@@ -197,7 +197,7 @@
           <a:p>
             <a:fld id="{C6008823-FCAF-463E-94EF-3D90FBA998B6}" type="datetimeFigureOut">
               <a:rPr kumimoji="1" lang="ja-JP" altLang="en-US" smtClean="0"/>
-              <a:t>2017/10/2</a:t>
+              <a:t>2018/2/4</a:t>
             </a:fld>
             <a:endParaRPr kumimoji="1" lang="ja-JP" altLang="en-US"/>
           </a:p>
@@ -628,7 +628,7 @@
           <a:p>
             <a:fld id="{00847B48-4B8E-4EE4-B8DC-337C16431560}" type="datetimeFigureOut">
               <a:rPr kumimoji="1" lang="ja-JP" altLang="en-US" smtClean="0"/>
-              <a:t>2017/10/2</a:t>
+              <a:t>2018/2/4</a:t>
             </a:fld>
             <a:endParaRPr kumimoji="1" lang="ja-JP" altLang="en-US"/>
           </a:p>
@@ -830,7 +830,7 @@
           <a:p>
             <a:fld id="{00847B48-4B8E-4EE4-B8DC-337C16431560}" type="datetimeFigureOut">
               <a:rPr kumimoji="1" lang="ja-JP" altLang="en-US" smtClean="0"/>
-              <a:t>2017/10/2</a:t>
+              <a:t>2018/2/4</a:t>
             </a:fld>
             <a:endParaRPr kumimoji="1" lang="ja-JP" altLang="en-US"/>
           </a:p>
@@ -1042,7 +1042,7 @@
           <a:p>
             <a:fld id="{00847B48-4B8E-4EE4-B8DC-337C16431560}" type="datetimeFigureOut">
               <a:rPr kumimoji="1" lang="ja-JP" altLang="en-US" smtClean="0"/>
-              <a:t>2017/10/2</a:t>
+              <a:t>2018/2/4</a:t>
             </a:fld>
             <a:endParaRPr kumimoji="1" lang="ja-JP" altLang="en-US"/>
           </a:p>
@@ -1244,7 +1244,7 @@
           <a:p>
             <a:fld id="{00847B48-4B8E-4EE4-B8DC-337C16431560}" type="datetimeFigureOut">
               <a:rPr kumimoji="1" lang="ja-JP" altLang="en-US" smtClean="0"/>
-              <a:t>2017/10/2</a:t>
+              <a:t>2018/2/4</a:t>
             </a:fld>
             <a:endParaRPr kumimoji="1" lang="ja-JP" altLang="en-US"/>
           </a:p>
@@ -1488,7 +1488,7 @@
           <a:p>
             <a:fld id="{00847B48-4B8E-4EE4-B8DC-337C16431560}" type="datetimeFigureOut">
               <a:rPr kumimoji="1" lang="ja-JP" altLang="en-US" smtClean="0"/>
-              <a:t>2017/10/2</a:t>
+              <a:t>2018/2/4</a:t>
             </a:fld>
             <a:endParaRPr kumimoji="1" lang="ja-JP" altLang="en-US"/>
           </a:p>
@@ -1784,7 +1784,7 @@
           <a:p>
             <a:fld id="{00847B48-4B8E-4EE4-B8DC-337C16431560}" type="datetimeFigureOut">
               <a:rPr kumimoji="1" lang="ja-JP" altLang="en-US" smtClean="0"/>
-              <a:t>2017/10/2</a:t>
+              <a:t>2018/2/4</a:t>
             </a:fld>
             <a:endParaRPr kumimoji="1" lang="ja-JP" altLang="en-US"/>
           </a:p>
@@ -2215,7 +2215,7 @@
           <a:p>
             <a:fld id="{00847B48-4B8E-4EE4-B8DC-337C16431560}" type="datetimeFigureOut">
               <a:rPr kumimoji="1" lang="ja-JP" altLang="en-US" smtClean="0"/>
-              <a:t>2017/10/2</a:t>
+              <a:t>2018/2/4</a:t>
             </a:fld>
             <a:endParaRPr kumimoji="1" lang="ja-JP" altLang="en-US"/>
           </a:p>
@@ -2333,7 +2333,7 @@
           <a:p>
             <a:fld id="{00847B48-4B8E-4EE4-B8DC-337C16431560}" type="datetimeFigureOut">
               <a:rPr kumimoji="1" lang="ja-JP" altLang="en-US" smtClean="0"/>
-              <a:t>2017/10/2</a:t>
+              <a:t>2018/2/4</a:t>
             </a:fld>
             <a:endParaRPr kumimoji="1" lang="ja-JP" altLang="en-US"/>
           </a:p>
@@ -2428,7 +2428,7 @@
           <a:p>
             <a:fld id="{00847B48-4B8E-4EE4-B8DC-337C16431560}" type="datetimeFigureOut">
               <a:rPr kumimoji="1" lang="ja-JP" altLang="en-US" smtClean="0"/>
-              <a:t>2017/10/2</a:t>
+              <a:t>2018/2/4</a:t>
             </a:fld>
             <a:endParaRPr kumimoji="1" lang="ja-JP" altLang="en-US"/>
           </a:p>
@@ -2737,7 +2737,7 @@
           <a:p>
             <a:fld id="{00847B48-4B8E-4EE4-B8DC-337C16431560}" type="datetimeFigureOut">
               <a:rPr kumimoji="1" lang="ja-JP" altLang="en-US" smtClean="0"/>
-              <a:t>2017/10/2</a:t>
+              <a:t>2018/2/4</a:t>
             </a:fld>
             <a:endParaRPr kumimoji="1" lang="ja-JP" altLang="en-US"/>
           </a:p>
@@ -2994,7 +2994,7 @@
           <a:p>
             <a:fld id="{00847B48-4B8E-4EE4-B8DC-337C16431560}" type="datetimeFigureOut">
               <a:rPr kumimoji="1" lang="ja-JP" altLang="en-US" smtClean="0"/>
-              <a:t>2017/10/2</a:t>
+              <a:t>2018/2/4</a:t>
             </a:fld>
             <a:endParaRPr kumimoji="1" lang="ja-JP" altLang="en-US"/>
           </a:p>
@@ -3239,7 +3239,7 @@
           <a:p>
             <a:fld id="{00847B48-4B8E-4EE4-B8DC-337C16431560}" type="datetimeFigureOut">
               <a:rPr kumimoji="1" lang="ja-JP" altLang="en-US" smtClean="0"/>
-              <a:t>2017/10/2</a:t>
+              <a:t>2018/2/4</a:t>
             </a:fld>
             <a:endParaRPr kumimoji="1" lang="ja-JP" altLang="en-US"/>
           </a:p>

</xml_diff>